<commit_message>
Complete work order demo
</commit_message>
<xml_diff>
--- a/OverheadSigns/WorkOrders2020PPTX/1004.pptx
+++ b/OverheadSigns/WorkOrders2020PPTX/1004.pptx
@@ -4,6 +4,12 @@
   <p:sldMasterIdLst>
     <p:sldMasterId id="2147483648" r:id="rId1"/>
   </p:sldMasterIdLst>
+  <p:sldIdLst>
+    <p:sldId id="256" r:id="rId7"/>
+    <p:sldId id="257" r:id="rId8"/>
+    <p:sldId id="258" r:id="rId9"/>
+    <p:sldId id="259" r:id="rId10"/>
+  </p:sldIdLst>
   <p:sldSz cx="9144000" cy="6858000" type="screen4x3"/>
   <p:notesSz cx="6858000" cy="9144000"/>
   <p:defaultTextStyle>
@@ -3073,6 +3079,1248 @@
     </p:otherStyle>
   </p:txStyles>
 </p:sldMaster>
+</file>
+
+<file path=ppt/slides/slide1.xml><?xml version="1.0" encoding="utf-8"?>
+<p:sld xmlns:a="http://schemas.openxmlformats.org/drawingml/2006/main" xmlns:p="http://schemas.openxmlformats.org/presentationml/2006/main" xmlns:r="http://schemas.openxmlformats.org/officeDocument/2006/relationships">
+  <p:cSld>
+    <p:spTree>
+      <p:nvGrpSpPr>
+        <p:cNvPr id="1" name=""/>
+        <p:cNvGrpSpPr/>
+        <p:nvPr/>
+      </p:nvGrpSpPr>
+      <p:grpSpPr/>
+      <p:sp>
+        <p:nvSpPr>
+          <p:cNvPr id="2" name="TextBox 1"/>
+          <p:cNvSpPr txBox="1"/>
+          <p:nvPr/>
+        </p:nvSpPr>
+        <p:spPr>
+          <a:xfrm>
+            <a:off x="228600" y="365760"/>
+            <a:ext cx="6858000" cy="685800"/>
+          </a:xfrm>
+          <a:prstGeom prst="rect">
+            <a:avLst/>
+          </a:prstGeom>
+          <a:noFill/>
+        </p:spPr>
+        <p:txBody>
+          <a:bodyPr wrap="none">
+            <a:spAutoFit/>
+          </a:bodyPr>
+          <a:lstStyle/>
+          <a:p>
+            <a:r>
+              <a:rPr sz="2000" b="1">
+                <a:latin typeface="Arial"/>
+              </a:rPr>
+              <a:t>Austin Transportation Department Signs Work Orders</a:t>
+            </a:r>
+          </a:p>
+        </p:txBody>
+      </p:sp>
+      <p:pic>
+        <p:nvPicPr>
+          <p:cNvPr id="3" name="Picture 2" descr="seal.png"/>
+          <p:cNvPicPr>
+            <a:picLocks noChangeAspect="1"/>
+          </p:cNvPicPr>
+          <p:nvPr/>
+        </p:nvPicPr>
+        <p:blipFill>
+          <a:blip r:embed="rId2"/>
+          <a:stretch>
+            <a:fillRect/>
+          </a:stretch>
+        </p:blipFill>
+        <p:spPr>
+          <a:xfrm>
+            <a:off x="7772400" y="228600"/>
+            <a:ext cx="571500" cy="571500"/>
+          </a:xfrm>
+          <a:prstGeom prst="rect">
+            <a:avLst/>
+          </a:prstGeom>
+        </p:spPr>
+      </p:pic>
+      <p:sp>
+        <p:nvSpPr>
+          <p:cNvPr id="4" name="TextBox 3"/>
+          <p:cNvSpPr txBox="1"/>
+          <p:nvPr/>
+        </p:nvSpPr>
+        <p:spPr>
+          <a:xfrm>
+            <a:off x="7543800" y="1051560"/>
+            <a:ext cx="1371600" cy="4114800"/>
+          </a:xfrm>
+          <a:prstGeom prst="rect">
+            <a:avLst/>
+          </a:prstGeom>
+          <a:noFill/>
+        </p:spPr>
+        <p:txBody>
+          <a:bodyPr wrap="square">
+            <a:spAutoFit/>
+          </a:bodyPr>
+          <a:lstStyle/>
+          <a:p>
+            <a:r>
+              <a:rPr sz="1200">
+                <a:latin typeface="Arial"/>
+              </a:rPr>
+              <a:t>Created By: Susanne Gov
+Created Date: 2020-05-21
+Location Name: US 290 HWY / W 290 WB AT JOE TANNER TRN
+Intersection ID: 5145318
+Cardinal Direction: N</a:t>
+            </a:r>
+          </a:p>
+        </p:txBody>
+      </p:sp>
+      <p:graphicFrame>
+        <p:nvGraphicFramePr>
+          <p:cNvPr id="5" name="Table 4"/>
+          <p:cNvGraphicFramePr>
+            <a:graphicFrameLocks noGrp="1"/>
+          </p:cNvGraphicFramePr>
+          <p:nvPr/>
+        </p:nvGraphicFramePr>
+        <p:xfrm>
+          <a:off x="228600" y="4754880"/>
+          <a:ext cx="7086600" cy="1371600"/>
+        </p:xfrm>
+        <a:graphic>
+          <a:graphicData uri="http://schemas.openxmlformats.org/drawingml/2006/table">
+            <a:tbl>
+              <a:tblPr firstRow="1" bandRow="1">
+                <a:tableStyleId>{5C22544A-7EE6-4342-B048-85BDC9FD1C3A}</a:tableStyleId>
+              </a:tblPr>
+              <a:tblGrid>
+                <a:gridCol w="4800600"/>
+                <a:gridCol w="2286000"/>
+              </a:tblGrid>
+              <a:tr h="228600">
+                <a:tc>
+                  <a:txBody>
+                    <a:bodyPr/>
+                    <a:lstStyle/>
+                    <a:p>
+                      <a:pPr>
+                        <a:defRPr sz="1200"/>
+                      </a:pPr>
+                      <a:r>
+                        <a:t>Sign Type</a:t>
+                      </a:r>
+                    </a:p>
+                  </a:txBody>
+                  <a:tcPr/>
+                </a:tc>
+                <a:tc>
+                  <a:txBody>
+                    <a:bodyPr/>
+                    <a:lstStyle/>
+                    <a:p>
+                      <a:pPr>
+                        <a:defRPr sz="1200"/>
+                      </a:pPr>
+                      <a:r>
+                        <a:t>Install/Remove</a:t>
+                      </a:r>
+                    </a:p>
+                  </a:txBody>
+                  <a:tcPr/>
+                </a:tc>
+              </a:tr>
+              <a:tr h="228600">
+                <a:tc>
+                  <a:txBody>
+                    <a:bodyPr/>
+                    <a:lstStyle/>
+                    <a:p>
+                      <a:pPr>
+                        <a:defRPr sz="1200"/>
+                      </a:pPr>
+                    </a:p>
+                  </a:txBody>
+                  <a:tcPr/>
+                </a:tc>
+                <a:tc>
+                  <a:txBody>
+                    <a:bodyPr/>
+                    <a:lstStyle/>
+                    <a:p>
+                      <a:pPr>
+                        <a:defRPr sz="1200"/>
+                      </a:pPr>
+                    </a:p>
+                  </a:txBody>
+                  <a:tcPr/>
+                </a:tc>
+              </a:tr>
+              <a:tr h="228600">
+                <a:tc>
+                  <a:txBody>
+                    <a:bodyPr/>
+                    <a:lstStyle/>
+                    <a:p>
+                      <a:pPr>
+                        <a:defRPr sz="1200"/>
+                      </a:pPr>
+                    </a:p>
+                  </a:txBody>
+                  <a:tcPr/>
+                </a:tc>
+                <a:tc>
+                  <a:txBody>
+                    <a:bodyPr/>
+                    <a:lstStyle/>
+                    <a:p>
+                      <a:pPr>
+                        <a:defRPr sz="1200"/>
+                      </a:pPr>
+                    </a:p>
+                  </a:txBody>
+                  <a:tcPr/>
+                </a:tc>
+              </a:tr>
+              <a:tr h="228600">
+                <a:tc>
+                  <a:txBody>
+                    <a:bodyPr/>
+                    <a:lstStyle/>
+                    <a:p>
+                      <a:pPr>
+                        <a:defRPr sz="1200"/>
+                      </a:pPr>
+                    </a:p>
+                  </a:txBody>
+                  <a:tcPr/>
+                </a:tc>
+                <a:tc>
+                  <a:txBody>
+                    <a:bodyPr/>
+                    <a:lstStyle/>
+                    <a:p>
+                      <a:pPr>
+                        <a:defRPr sz="1200"/>
+                      </a:pPr>
+                    </a:p>
+                  </a:txBody>
+                  <a:tcPr/>
+                </a:tc>
+              </a:tr>
+              <a:tr h="228600">
+                <a:tc>
+                  <a:txBody>
+                    <a:bodyPr/>
+                    <a:lstStyle/>
+                    <a:p>
+                      <a:pPr>
+                        <a:defRPr sz="1200"/>
+                      </a:pPr>
+                    </a:p>
+                  </a:txBody>
+                  <a:tcPr/>
+                </a:tc>
+                <a:tc>
+                  <a:txBody>
+                    <a:bodyPr/>
+                    <a:lstStyle/>
+                    <a:p>
+                      <a:pPr>
+                        <a:defRPr sz="1200"/>
+                      </a:pPr>
+                    </a:p>
+                  </a:txBody>
+                  <a:tcPr/>
+                </a:tc>
+              </a:tr>
+              <a:tr h="228600">
+                <a:tc>
+                  <a:txBody>
+                    <a:bodyPr/>
+                    <a:lstStyle/>
+                    <a:p>
+                      <a:pPr>
+                        <a:defRPr sz="1200"/>
+                      </a:pPr>
+                    </a:p>
+                  </a:txBody>
+                  <a:tcPr/>
+                </a:tc>
+                <a:tc>
+                  <a:txBody>
+                    <a:bodyPr/>
+                    <a:lstStyle/>
+                    <a:p>
+                      <a:pPr>
+                        <a:defRPr sz="1200"/>
+                      </a:pPr>
+                    </a:p>
+                  </a:txBody>
+                  <a:tcPr/>
+                </a:tc>
+              </a:tr>
+            </a:tbl>
+          </a:graphicData>
+        </a:graphic>
+      </p:graphicFrame>
+    </p:spTree>
+  </p:cSld>
+  <p:clrMapOvr>
+    <a:masterClrMapping/>
+  </p:clrMapOvr>
+</p:sld>
+</file>
+
+<file path=ppt/slides/slide2.xml><?xml version="1.0" encoding="utf-8"?>
+<p:sld xmlns:a="http://schemas.openxmlformats.org/drawingml/2006/main" xmlns:p="http://schemas.openxmlformats.org/presentationml/2006/main" xmlns:r="http://schemas.openxmlformats.org/officeDocument/2006/relationships">
+  <p:cSld>
+    <p:spTree>
+      <p:nvGrpSpPr>
+        <p:cNvPr id="1" name=""/>
+        <p:cNvGrpSpPr/>
+        <p:nvPr/>
+      </p:nvGrpSpPr>
+      <p:grpSpPr/>
+      <p:sp>
+        <p:nvSpPr>
+          <p:cNvPr id="2" name="TextBox 1"/>
+          <p:cNvSpPr txBox="1"/>
+          <p:nvPr/>
+        </p:nvSpPr>
+        <p:spPr>
+          <a:xfrm>
+            <a:off x="228600" y="365760"/>
+            <a:ext cx="6858000" cy="685800"/>
+          </a:xfrm>
+          <a:prstGeom prst="rect">
+            <a:avLst/>
+          </a:prstGeom>
+          <a:noFill/>
+        </p:spPr>
+        <p:txBody>
+          <a:bodyPr wrap="none">
+            <a:spAutoFit/>
+          </a:bodyPr>
+          <a:lstStyle/>
+          <a:p>
+            <a:r>
+              <a:rPr sz="2000" b="1">
+                <a:latin typeface="Arial"/>
+              </a:rPr>
+              <a:t>Austin Transportation Department Signs Work Orders</a:t>
+            </a:r>
+          </a:p>
+        </p:txBody>
+      </p:sp>
+      <p:pic>
+        <p:nvPicPr>
+          <p:cNvPr id="3" name="Picture 2" descr="seal.png"/>
+          <p:cNvPicPr>
+            <a:picLocks noChangeAspect="1"/>
+          </p:cNvPicPr>
+          <p:nvPr/>
+        </p:nvPicPr>
+        <p:blipFill>
+          <a:blip r:embed="rId2"/>
+          <a:stretch>
+            <a:fillRect/>
+          </a:stretch>
+        </p:blipFill>
+        <p:spPr>
+          <a:xfrm>
+            <a:off x="7772400" y="228600"/>
+            <a:ext cx="571500" cy="571500"/>
+          </a:xfrm>
+          <a:prstGeom prst="rect">
+            <a:avLst/>
+          </a:prstGeom>
+        </p:spPr>
+      </p:pic>
+      <p:pic>
+        <p:nvPicPr>
+          <p:cNvPr id="4" name="Picture 3" descr="1004_S.png"/>
+          <p:cNvPicPr>
+            <a:picLocks noChangeAspect="1"/>
+          </p:cNvPicPr>
+          <p:nvPr/>
+        </p:nvPicPr>
+        <p:blipFill>
+          <a:blip r:embed="rId3"/>
+          <a:stretch>
+            <a:fillRect/>
+          </a:stretch>
+        </p:blipFill>
+        <p:spPr>
+          <a:xfrm>
+            <a:off x="228600" y="1005840"/>
+            <a:ext cx="7086600" cy="3657600"/>
+          </a:xfrm>
+          <a:prstGeom prst="rect">
+            <a:avLst/>
+          </a:prstGeom>
+          <a:ln w="45720">
+            <a:solidFill>
+              <a:srgbClr val="000000"/>
+            </a:solidFill>
+          </a:ln>
+        </p:spPr>
+      </p:pic>
+      <p:sp>
+        <p:nvSpPr>
+          <p:cNvPr id="5" name="TextBox 4"/>
+          <p:cNvSpPr txBox="1"/>
+          <p:nvPr/>
+        </p:nvSpPr>
+        <p:spPr>
+          <a:xfrm>
+            <a:off x="7543800" y="1051560"/>
+            <a:ext cx="1371600" cy="4114800"/>
+          </a:xfrm>
+          <a:prstGeom prst="rect">
+            <a:avLst/>
+          </a:prstGeom>
+          <a:noFill/>
+        </p:spPr>
+        <p:txBody>
+          <a:bodyPr wrap="square">
+            <a:spAutoFit/>
+          </a:bodyPr>
+          <a:lstStyle/>
+          <a:p>
+            <a:r>
+              <a:rPr sz="1200">
+                <a:latin typeface="Arial"/>
+              </a:rPr>
+              <a:t>Created By: Susanne Gov
+Created Date: 2020-05-21
+Location Name: US 290 HWY / W 290 WB AT JOE TANNER TRN
+Intersection ID: 5145318
+Cardinal Direction: S</a:t>
+            </a:r>
+          </a:p>
+        </p:txBody>
+      </p:sp>
+      <p:graphicFrame>
+        <p:nvGraphicFramePr>
+          <p:cNvPr id="6" name="Table 5"/>
+          <p:cNvGraphicFramePr>
+            <a:graphicFrameLocks noGrp="1"/>
+          </p:cNvGraphicFramePr>
+          <p:nvPr/>
+        </p:nvGraphicFramePr>
+        <p:xfrm>
+          <a:off x="228600" y="4754880"/>
+          <a:ext cx="7086600" cy="1371600"/>
+        </p:xfrm>
+        <a:graphic>
+          <a:graphicData uri="http://schemas.openxmlformats.org/drawingml/2006/table">
+            <a:tbl>
+              <a:tblPr firstRow="1" bandRow="1">
+                <a:tableStyleId>{5C22544A-7EE6-4342-B048-85BDC9FD1C3A}</a:tableStyleId>
+              </a:tblPr>
+              <a:tblGrid>
+                <a:gridCol w="4800600"/>
+                <a:gridCol w="2286000"/>
+              </a:tblGrid>
+              <a:tr h="228600">
+                <a:tc>
+                  <a:txBody>
+                    <a:bodyPr/>
+                    <a:lstStyle/>
+                    <a:p>
+                      <a:pPr>
+                        <a:defRPr sz="1200"/>
+                      </a:pPr>
+                      <a:r>
+                        <a:t>Sign Type</a:t>
+                      </a:r>
+                    </a:p>
+                  </a:txBody>
+                  <a:tcPr/>
+                </a:tc>
+                <a:tc>
+                  <a:txBody>
+                    <a:bodyPr/>
+                    <a:lstStyle/>
+                    <a:p>
+                      <a:pPr>
+                        <a:defRPr sz="1200"/>
+                      </a:pPr>
+                      <a:r>
+                        <a:t>Install/Remove</a:t>
+                      </a:r>
+                    </a:p>
+                  </a:txBody>
+                  <a:tcPr/>
+                </a:tc>
+              </a:tr>
+              <a:tr h="228600">
+                <a:tc>
+                  <a:txBody>
+                    <a:bodyPr/>
+                    <a:lstStyle/>
+                    <a:p>
+                      <a:pPr>
+                        <a:defRPr sz="1200"/>
+                      </a:pPr>
+                    </a:p>
+                  </a:txBody>
+                  <a:tcPr/>
+                </a:tc>
+                <a:tc>
+                  <a:txBody>
+                    <a:bodyPr/>
+                    <a:lstStyle/>
+                    <a:p>
+                      <a:pPr>
+                        <a:defRPr sz="1200"/>
+                      </a:pPr>
+                    </a:p>
+                  </a:txBody>
+                  <a:tcPr/>
+                </a:tc>
+              </a:tr>
+              <a:tr h="228600">
+                <a:tc>
+                  <a:txBody>
+                    <a:bodyPr/>
+                    <a:lstStyle/>
+                    <a:p>
+                      <a:pPr>
+                        <a:defRPr sz="1200"/>
+                      </a:pPr>
+                    </a:p>
+                  </a:txBody>
+                  <a:tcPr/>
+                </a:tc>
+                <a:tc>
+                  <a:txBody>
+                    <a:bodyPr/>
+                    <a:lstStyle/>
+                    <a:p>
+                      <a:pPr>
+                        <a:defRPr sz="1200"/>
+                      </a:pPr>
+                    </a:p>
+                  </a:txBody>
+                  <a:tcPr/>
+                </a:tc>
+              </a:tr>
+              <a:tr h="228600">
+                <a:tc>
+                  <a:txBody>
+                    <a:bodyPr/>
+                    <a:lstStyle/>
+                    <a:p>
+                      <a:pPr>
+                        <a:defRPr sz="1200"/>
+                      </a:pPr>
+                    </a:p>
+                  </a:txBody>
+                  <a:tcPr/>
+                </a:tc>
+                <a:tc>
+                  <a:txBody>
+                    <a:bodyPr/>
+                    <a:lstStyle/>
+                    <a:p>
+                      <a:pPr>
+                        <a:defRPr sz="1200"/>
+                      </a:pPr>
+                    </a:p>
+                  </a:txBody>
+                  <a:tcPr/>
+                </a:tc>
+              </a:tr>
+              <a:tr h="228600">
+                <a:tc>
+                  <a:txBody>
+                    <a:bodyPr/>
+                    <a:lstStyle/>
+                    <a:p>
+                      <a:pPr>
+                        <a:defRPr sz="1200"/>
+                      </a:pPr>
+                    </a:p>
+                  </a:txBody>
+                  <a:tcPr/>
+                </a:tc>
+                <a:tc>
+                  <a:txBody>
+                    <a:bodyPr/>
+                    <a:lstStyle/>
+                    <a:p>
+                      <a:pPr>
+                        <a:defRPr sz="1200"/>
+                      </a:pPr>
+                    </a:p>
+                  </a:txBody>
+                  <a:tcPr/>
+                </a:tc>
+              </a:tr>
+              <a:tr h="228600">
+                <a:tc>
+                  <a:txBody>
+                    <a:bodyPr/>
+                    <a:lstStyle/>
+                    <a:p>
+                      <a:pPr>
+                        <a:defRPr sz="1200"/>
+                      </a:pPr>
+                    </a:p>
+                  </a:txBody>
+                  <a:tcPr/>
+                </a:tc>
+                <a:tc>
+                  <a:txBody>
+                    <a:bodyPr/>
+                    <a:lstStyle/>
+                    <a:p>
+                      <a:pPr>
+                        <a:defRPr sz="1200"/>
+                      </a:pPr>
+                    </a:p>
+                  </a:txBody>
+                  <a:tcPr/>
+                </a:tc>
+              </a:tr>
+            </a:tbl>
+          </a:graphicData>
+        </a:graphic>
+      </p:graphicFrame>
+    </p:spTree>
+  </p:cSld>
+  <p:clrMapOvr>
+    <a:masterClrMapping/>
+  </p:clrMapOvr>
+</p:sld>
+</file>
+
+<file path=ppt/slides/slide3.xml><?xml version="1.0" encoding="utf-8"?>
+<p:sld xmlns:a="http://schemas.openxmlformats.org/drawingml/2006/main" xmlns:p="http://schemas.openxmlformats.org/presentationml/2006/main" xmlns:r="http://schemas.openxmlformats.org/officeDocument/2006/relationships">
+  <p:cSld>
+    <p:spTree>
+      <p:nvGrpSpPr>
+        <p:cNvPr id="1" name=""/>
+        <p:cNvGrpSpPr/>
+        <p:nvPr/>
+      </p:nvGrpSpPr>
+      <p:grpSpPr/>
+      <p:sp>
+        <p:nvSpPr>
+          <p:cNvPr id="2" name="TextBox 1"/>
+          <p:cNvSpPr txBox="1"/>
+          <p:nvPr/>
+        </p:nvSpPr>
+        <p:spPr>
+          <a:xfrm>
+            <a:off x="228600" y="365760"/>
+            <a:ext cx="6858000" cy="685800"/>
+          </a:xfrm>
+          <a:prstGeom prst="rect">
+            <a:avLst/>
+          </a:prstGeom>
+          <a:noFill/>
+        </p:spPr>
+        <p:txBody>
+          <a:bodyPr wrap="none">
+            <a:spAutoFit/>
+          </a:bodyPr>
+          <a:lstStyle/>
+          <a:p>
+            <a:r>
+              <a:rPr sz="2000" b="1">
+                <a:latin typeface="Arial"/>
+              </a:rPr>
+              <a:t>Austin Transportation Department Signs Work Orders</a:t>
+            </a:r>
+          </a:p>
+        </p:txBody>
+      </p:sp>
+      <p:pic>
+        <p:nvPicPr>
+          <p:cNvPr id="3" name="Picture 2" descr="seal.png"/>
+          <p:cNvPicPr>
+            <a:picLocks noChangeAspect="1"/>
+          </p:cNvPicPr>
+          <p:nvPr/>
+        </p:nvPicPr>
+        <p:blipFill>
+          <a:blip r:embed="rId2"/>
+          <a:stretch>
+            <a:fillRect/>
+          </a:stretch>
+        </p:blipFill>
+        <p:spPr>
+          <a:xfrm>
+            <a:off x="7772400" y="228600"/>
+            <a:ext cx="571500" cy="571500"/>
+          </a:xfrm>
+          <a:prstGeom prst="rect">
+            <a:avLst/>
+          </a:prstGeom>
+        </p:spPr>
+      </p:pic>
+      <p:pic>
+        <p:nvPicPr>
+          <p:cNvPr id="4" name="Picture 3" descr="1004_E.png"/>
+          <p:cNvPicPr>
+            <a:picLocks noChangeAspect="1"/>
+          </p:cNvPicPr>
+          <p:nvPr/>
+        </p:nvPicPr>
+        <p:blipFill>
+          <a:blip r:embed="rId3"/>
+          <a:stretch>
+            <a:fillRect/>
+          </a:stretch>
+        </p:blipFill>
+        <p:spPr>
+          <a:xfrm>
+            <a:off x="228600" y="1005840"/>
+            <a:ext cx="7086600" cy="3657600"/>
+          </a:xfrm>
+          <a:prstGeom prst="rect">
+            <a:avLst/>
+          </a:prstGeom>
+          <a:ln w="45720">
+            <a:solidFill>
+              <a:srgbClr val="000000"/>
+            </a:solidFill>
+          </a:ln>
+        </p:spPr>
+      </p:pic>
+      <p:sp>
+        <p:nvSpPr>
+          <p:cNvPr id="5" name="TextBox 4"/>
+          <p:cNvSpPr txBox="1"/>
+          <p:nvPr/>
+        </p:nvSpPr>
+        <p:spPr>
+          <a:xfrm>
+            <a:off x="7543800" y="1051560"/>
+            <a:ext cx="1371600" cy="4114800"/>
+          </a:xfrm>
+          <a:prstGeom prst="rect">
+            <a:avLst/>
+          </a:prstGeom>
+          <a:noFill/>
+        </p:spPr>
+        <p:txBody>
+          <a:bodyPr wrap="square">
+            <a:spAutoFit/>
+          </a:bodyPr>
+          <a:lstStyle/>
+          <a:p>
+            <a:r>
+              <a:rPr sz="1200">
+                <a:latin typeface="Arial"/>
+              </a:rPr>
+              <a:t>Created By: Susanne Gov
+Created Date: 2020-05-21
+Location Name: US 290 HWY / W 290 WB AT JOE TANNER TRN
+Intersection ID: 5145318
+Cardinal Direction: E</a:t>
+            </a:r>
+          </a:p>
+        </p:txBody>
+      </p:sp>
+      <p:graphicFrame>
+        <p:nvGraphicFramePr>
+          <p:cNvPr id="6" name="Table 5"/>
+          <p:cNvGraphicFramePr>
+            <a:graphicFrameLocks noGrp="1"/>
+          </p:cNvGraphicFramePr>
+          <p:nvPr/>
+        </p:nvGraphicFramePr>
+        <p:xfrm>
+          <a:off x="228600" y="4754880"/>
+          <a:ext cx="7086600" cy="1371600"/>
+        </p:xfrm>
+        <a:graphic>
+          <a:graphicData uri="http://schemas.openxmlformats.org/drawingml/2006/table">
+            <a:tbl>
+              <a:tblPr firstRow="1" bandRow="1">
+                <a:tableStyleId>{5C22544A-7EE6-4342-B048-85BDC9FD1C3A}</a:tableStyleId>
+              </a:tblPr>
+              <a:tblGrid>
+                <a:gridCol w="4800600"/>
+                <a:gridCol w="2286000"/>
+              </a:tblGrid>
+              <a:tr h="228600">
+                <a:tc>
+                  <a:txBody>
+                    <a:bodyPr/>
+                    <a:lstStyle/>
+                    <a:p>
+                      <a:pPr>
+                        <a:defRPr sz="1200"/>
+                      </a:pPr>
+                      <a:r>
+                        <a:t>Sign Type</a:t>
+                      </a:r>
+                    </a:p>
+                  </a:txBody>
+                  <a:tcPr/>
+                </a:tc>
+                <a:tc>
+                  <a:txBody>
+                    <a:bodyPr/>
+                    <a:lstStyle/>
+                    <a:p>
+                      <a:pPr>
+                        <a:defRPr sz="1200"/>
+                      </a:pPr>
+                      <a:r>
+                        <a:t>Install/Remove</a:t>
+                      </a:r>
+                    </a:p>
+                  </a:txBody>
+                  <a:tcPr/>
+                </a:tc>
+              </a:tr>
+              <a:tr h="228600">
+                <a:tc>
+                  <a:txBody>
+                    <a:bodyPr/>
+                    <a:lstStyle/>
+                    <a:p>
+                      <a:pPr>
+                        <a:defRPr sz="1200"/>
+                      </a:pPr>
+                    </a:p>
+                  </a:txBody>
+                  <a:tcPr/>
+                </a:tc>
+                <a:tc>
+                  <a:txBody>
+                    <a:bodyPr/>
+                    <a:lstStyle/>
+                    <a:p>
+                      <a:pPr>
+                        <a:defRPr sz="1200"/>
+                      </a:pPr>
+                    </a:p>
+                  </a:txBody>
+                  <a:tcPr/>
+                </a:tc>
+              </a:tr>
+              <a:tr h="228600">
+                <a:tc>
+                  <a:txBody>
+                    <a:bodyPr/>
+                    <a:lstStyle/>
+                    <a:p>
+                      <a:pPr>
+                        <a:defRPr sz="1200"/>
+                      </a:pPr>
+                    </a:p>
+                  </a:txBody>
+                  <a:tcPr/>
+                </a:tc>
+                <a:tc>
+                  <a:txBody>
+                    <a:bodyPr/>
+                    <a:lstStyle/>
+                    <a:p>
+                      <a:pPr>
+                        <a:defRPr sz="1200"/>
+                      </a:pPr>
+                    </a:p>
+                  </a:txBody>
+                  <a:tcPr/>
+                </a:tc>
+              </a:tr>
+              <a:tr h="228600">
+                <a:tc>
+                  <a:txBody>
+                    <a:bodyPr/>
+                    <a:lstStyle/>
+                    <a:p>
+                      <a:pPr>
+                        <a:defRPr sz="1200"/>
+                      </a:pPr>
+                    </a:p>
+                  </a:txBody>
+                  <a:tcPr/>
+                </a:tc>
+                <a:tc>
+                  <a:txBody>
+                    <a:bodyPr/>
+                    <a:lstStyle/>
+                    <a:p>
+                      <a:pPr>
+                        <a:defRPr sz="1200"/>
+                      </a:pPr>
+                    </a:p>
+                  </a:txBody>
+                  <a:tcPr/>
+                </a:tc>
+              </a:tr>
+              <a:tr h="228600">
+                <a:tc>
+                  <a:txBody>
+                    <a:bodyPr/>
+                    <a:lstStyle/>
+                    <a:p>
+                      <a:pPr>
+                        <a:defRPr sz="1200"/>
+                      </a:pPr>
+                    </a:p>
+                  </a:txBody>
+                  <a:tcPr/>
+                </a:tc>
+                <a:tc>
+                  <a:txBody>
+                    <a:bodyPr/>
+                    <a:lstStyle/>
+                    <a:p>
+                      <a:pPr>
+                        <a:defRPr sz="1200"/>
+                      </a:pPr>
+                    </a:p>
+                  </a:txBody>
+                  <a:tcPr/>
+                </a:tc>
+              </a:tr>
+              <a:tr h="228600">
+                <a:tc>
+                  <a:txBody>
+                    <a:bodyPr/>
+                    <a:lstStyle/>
+                    <a:p>
+                      <a:pPr>
+                        <a:defRPr sz="1200"/>
+                      </a:pPr>
+                    </a:p>
+                  </a:txBody>
+                  <a:tcPr/>
+                </a:tc>
+                <a:tc>
+                  <a:txBody>
+                    <a:bodyPr/>
+                    <a:lstStyle/>
+                    <a:p>
+                      <a:pPr>
+                        <a:defRPr sz="1200"/>
+                      </a:pPr>
+                    </a:p>
+                  </a:txBody>
+                  <a:tcPr/>
+                </a:tc>
+              </a:tr>
+            </a:tbl>
+          </a:graphicData>
+        </a:graphic>
+      </p:graphicFrame>
+    </p:spTree>
+  </p:cSld>
+  <p:clrMapOvr>
+    <a:masterClrMapping/>
+  </p:clrMapOvr>
+</p:sld>
+</file>
+
+<file path=ppt/slides/slide4.xml><?xml version="1.0" encoding="utf-8"?>
+<p:sld xmlns:a="http://schemas.openxmlformats.org/drawingml/2006/main" xmlns:p="http://schemas.openxmlformats.org/presentationml/2006/main" xmlns:r="http://schemas.openxmlformats.org/officeDocument/2006/relationships">
+  <p:cSld>
+    <p:spTree>
+      <p:nvGrpSpPr>
+        <p:cNvPr id="1" name=""/>
+        <p:cNvGrpSpPr/>
+        <p:nvPr/>
+      </p:nvGrpSpPr>
+      <p:grpSpPr/>
+      <p:sp>
+        <p:nvSpPr>
+          <p:cNvPr id="2" name="TextBox 1"/>
+          <p:cNvSpPr txBox="1"/>
+          <p:nvPr/>
+        </p:nvSpPr>
+        <p:spPr>
+          <a:xfrm>
+            <a:off x="228600" y="365760"/>
+            <a:ext cx="6858000" cy="685800"/>
+          </a:xfrm>
+          <a:prstGeom prst="rect">
+            <a:avLst/>
+          </a:prstGeom>
+          <a:noFill/>
+        </p:spPr>
+        <p:txBody>
+          <a:bodyPr wrap="none">
+            <a:spAutoFit/>
+          </a:bodyPr>
+          <a:lstStyle/>
+          <a:p>
+            <a:r>
+              <a:rPr sz="2000" b="1">
+                <a:latin typeface="Arial"/>
+              </a:rPr>
+              <a:t>Austin Transportation Department Signs Work Orders</a:t>
+            </a:r>
+          </a:p>
+        </p:txBody>
+      </p:sp>
+      <p:pic>
+        <p:nvPicPr>
+          <p:cNvPr id="3" name="Picture 2" descr="seal.png"/>
+          <p:cNvPicPr>
+            <a:picLocks noChangeAspect="1"/>
+          </p:cNvPicPr>
+          <p:nvPr/>
+        </p:nvPicPr>
+        <p:blipFill>
+          <a:blip r:embed="rId2"/>
+          <a:stretch>
+            <a:fillRect/>
+          </a:stretch>
+        </p:blipFill>
+        <p:spPr>
+          <a:xfrm>
+            <a:off x="7772400" y="228600"/>
+            <a:ext cx="571500" cy="571500"/>
+          </a:xfrm>
+          <a:prstGeom prst="rect">
+            <a:avLst/>
+          </a:prstGeom>
+        </p:spPr>
+      </p:pic>
+      <p:sp>
+        <p:nvSpPr>
+          <p:cNvPr id="4" name="TextBox 3"/>
+          <p:cNvSpPr txBox="1"/>
+          <p:nvPr/>
+        </p:nvSpPr>
+        <p:spPr>
+          <a:xfrm>
+            <a:off x="7543800" y="1051560"/>
+            <a:ext cx="1371600" cy="4114800"/>
+          </a:xfrm>
+          <a:prstGeom prst="rect">
+            <a:avLst/>
+          </a:prstGeom>
+          <a:noFill/>
+        </p:spPr>
+        <p:txBody>
+          <a:bodyPr wrap="square">
+            <a:spAutoFit/>
+          </a:bodyPr>
+          <a:lstStyle/>
+          <a:p>
+            <a:r>
+              <a:rPr sz="1200">
+                <a:latin typeface="Arial"/>
+              </a:rPr>
+              <a:t>Created By: Susanne Gov
+Created Date: 2020-05-21
+Location Name: US 290 HWY / W 290 WB AT JOE TANNER TRN
+Intersection ID: 5145318
+Cardinal Direction: W</a:t>
+            </a:r>
+          </a:p>
+        </p:txBody>
+      </p:sp>
+      <p:graphicFrame>
+        <p:nvGraphicFramePr>
+          <p:cNvPr id="5" name="Table 4"/>
+          <p:cNvGraphicFramePr>
+            <a:graphicFrameLocks noGrp="1"/>
+          </p:cNvGraphicFramePr>
+          <p:nvPr/>
+        </p:nvGraphicFramePr>
+        <p:xfrm>
+          <a:off x="228600" y="4754880"/>
+          <a:ext cx="7086600" cy="1371600"/>
+        </p:xfrm>
+        <a:graphic>
+          <a:graphicData uri="http://schemas.openxmlformats.org/drawingml/2006/table">
+            <a:tbl>
+              <a:tblPr firstRow="1" bandRow="1">
+                <a:tableStyleId>{5C22544A-7EE6-4342-B048-85BDC9FD1C3A}</a:tableStyleId>
+              </a:tblPr>
+              <a:tblGrid>
+                <a:gridCol w="4800600"/>
+                <a:gridCol w="2286000"/>
+              </a:tblGrid>
+              <a:tr h="228600">
+                <a:tc>
+                  <a:txBody>
+                    <a:bodyPr/>
+                    <a:lstStyle/>
+                    <a:p>
+                      <a:pPr>
+                        <a:defRPr sz="1200"/>
+                      </a:pPr>
+                      <a:r>
+                        <a:t>Sign Type</a:t>
+                      </a:r>
+                    </a:p>
+                  </a:txBody>
+                  <a:tcPr/>
+                </a:tc>
+                <a:tc>
+                  <a:txBody>
+                    <a:bodyPr/>
+                    <a:lstStyle/>
+                    <a:p>
+                      <a:pPr>
+                        <a:defRPr sz="1200"/>
+                      </a:pPr>
+                      <a:r>
+                        <a:t>Install/Remove</a:t>
+                      </a:r>
+                    </a:p>
+                  </a:txBody>
+                  <a:tcPr/>
+                </a:tc>
+              </a:tr>
+              <a:tr h="228600">
+                <a:tc>
+                  <a:txBody>
+                    <a:bodyPr/>
+                    <a:lstStyle/>
+                    <a:p>
+                      <a:pPr>
+                        <a:defRPr sz="1200"/>
+                      </a:pPr>
+                    </a:p>
+                  </a:txBody>
+                  <a:tcPr/>
+                </a:tc>
+                <a:tc>
+                  <a:txBody>
+                    <a:bodyPr/>
+                    <a:lstStyle/>
+                    <a:p>
+                      <a:pPr>
+                        <a:defRPr sz="1200"/>
+                      </a:pPr>
+                    </a:p>
+                  </a:txBody>
+                  <a:tcPr/>
+                </a:tc>
+              </a:tr>
+              <a:tr h="228600">
+                <a:tc>
+                  <a:txBody>
+                    <a:bodyPr/>
+                    <a:lstStyle/>
+                    <a:p>
+                      <a:pPr>
+                        <a:defRPr sz="1200"/>
+                      </a:pPr>
+                    </a:p>
+                  </a:txBody>
+                  <a:tcPr/>
+                </a:tc>
+                <a:tc>
+                  <a:txBody>
+                    <a:bodyPr/>
+                    <a:lstStyle/>
+                    <a:p>
+                      <a:pPr>
+                        <a:defRPr sz="1200"/>
+                      </a:pPr>
+                    </a:p>
+                  </a:txBody>
+                  <a:tcPr/>
+                </a:tc>
+              </a:tr>
+              <a:tr h="228600">
+                <a:tc>
+                  <a:txBody>
+                    <a:bodyPr/>
+                    <a:lstStyle/>
+                    <a:p>
+                      <a:pPr>
+                        <a:defRPr sz="1200"/>
+                      </a:pPr>
+                    </a:p>
+                  </a:txBody>
+                  <a:tcPr/>
+                </a:tc>
+                <a:tc>
+                  <a:txBody>
+                    <a:bodyPr/>
+                    <a:lstStyle/>
+                    <a:p>
+                      <a:pPr>
+                        <a:defRPr sz="1200"/>
+                      </a:pPr>
+                    </a:p>
+                  </a:txBody>
+                  <a:tcPr/>
+                </a:tc>
+              </a:tr>
+              <a:tr h="228600">
+                <a:tc>
+                  <a:txBody>
+                    <a:bodyPr/>
+                    <a:lstStyle/>
+                    <a:p>
+                      <a:pPr>
+                        <a:defRPr sz="1200"/>
+                      </a:pPr>
+                    </a:p>
+                  </a:txBody>
+                  <a:tcPr/>
+                </a:tc>
+                <a:tc>
+                  <a:txBody>
+                    <a:bodyPr/>
+                    <a:lstStyle/>
+                    <a:p>
+                      <a:pPr>
+                        <a:defRPr sz="1200"/>
+                      </a:pPr>
+                    </a:p>
+                  </a:txBody>
+                  <a:tcPr/>
+                </a:tc>
+              </a:tr>
+              <a:tr h="228600">
+                <a:tc>
+                  <a:txBody>
+                    <a:bodyPr/>
+                    <a:lstStyle/>
+                    <a:p>
+                      <a:pPr>
+                        <a:defRPr sz="1200"/>
+                      </a:pPr>
+                    </a:p>
+                  </a:txBody>
+                  <a:tcPr/>
+                </a:tc>
+                <a:tc>
+                  <a:txBody>
+                    <a:bodyPr/>
+                    <a:lstStyle/>
+                    <a:p>
+                      <a:pPr>
+                        <a:defRPr sz="1200"/>
+                      </a:pPr>
+                    </a:p>
+                  </a:txBody>
+                  <a:tcPr/>
+                </a:tc>
+              </a:tr>
+            </a:tbl>
+          </a:graphicData>
+        </a:graphic>
+      </p:graphicFrame>
+    </p:spTree>
+  </p:cSld>
+  <p:clrMapOvr>
+    <a:masterClrMapping/>
+  </p:clrMapOvr>
+</p:sld>
 </file>
 
 <file path=ppt/theme/theme1.xml><?xml version="1.0" encoding="utf-8"?>

</xml_diff>